<commit_message>
add page for individual reponsiblity
</commit_message>
<xml_diff>
--- a/doc/Presentation1.pptx
+++ b/doc/Presentation1.pptx
@@ -4266,7 +4266,7 @@
               <a:t> </a:t>
             </a:r>
             <a:r>
-              <a:rPr kumimoji="1" lang="en-US" altLang="zh-CN"/>
+              <a:rPr kumimoji="1" lang="en-US" altLang="zh-CN" dirty="0"/>
               <a:t>score.</a:t>
             </a:r>
           </a:p>
@@ -14710,7 +14710,15 @@
             </a:pPr>
             <a:r>
               <a:rPr kumimoji="1" lang="en-US" altLang="zh-CN" sz="2400" b="1" dirty="0"/>
-              <a:t>Test on other dataset to evaluate the algorithm(BSDS500, etc.)</a:t>
+              <a:t>Test on other dataset to evaluate the algorithm(BSDS500,</a:t>
+            </a:r>
+            <a:r>
+              <a:rPr kumimoji="1" lang="zh-CN" altLang="en-US" sz="2400" b="1" dirty="0"/>
+              <a:t> </a:t>
+            </a:r>
+            <a:r>
+              <a:rPr kumimoji="1" lang="en-US" altLang="zh-CN" sz="2400" b="1" dirty="0"/>
+              <a:t>ImageNet etc.)</a:t>
             </a:r>
           </a:p>
           <a:p>
@@ -14777,7 +14785,7 @@
             </a:pPr>
             <a:r>
               <a:rPr kumimoji="1" lang="en-US" altLang="zh-CN" sz="2400" b="1" dirty="0"/>
-              <a:t>Try different architecture of Generator</a:t>
+              <a:t>Explore different architecture of Generator</a:t>
             </a:r>
             <a:r>
               <a:rPr kumimoji="1" lang="en-US" altLang="zh-CN" sz="2400" b="1" dirty="0">
@@ -14813,10 +14821,14 @@
               <a:buChar char="l"/>
             </a:pPr>
             <a:r>
+              <a:rPr kumimoji="1" lang="en-US" altLang="zh-CN" sz="2400" b="1" dirty="0"/>
+              <a:t>Explore</a:t>
+            </a:r>
+            <a:r>
               <a:rPr kumimoji="1" lang="en-US" altLang="zh-CN" sz="2400" b="1" dirty="0">
                 <a:sym typeface="Wingdings" pitchFamily="2" charset="2"/>
               </a:rPr>
-              <a:t>Try different architecture of Discriminator(</a:t>
+              <a:t> different architecture of Discriminator(</a:t>
             </a:r>
             <a:r>
               <a:rPr kumimoji="1" lang="en-US" altLang="zh-CN" sz="2400" b="1" dirty="0" err="1">
@@ -14934,7 +14946,7 @@
             </a:pPr>
             <a:r>
               <a:rPr kumimoji="1" lang="en-US" altLang="zh-CN" sz="3200" b="1" dirty="0"/>
-              <a:t>Personal</a:t>
+              <a:t>Individual</a:t>
             </a:r>
             <a:r>
               <a:rPr kumimoji="1" lang="zh-CN" altLang="en-US" sz="3200" b="1" dirty="0"/>
@@ -14945,6 +14957,269 @@
               <a:t>Responsibility</a:t>
             </a:r>
             <a:endParaRPr kumimoji="1" lang="zh-CN" altLang="en-US" sz="3200" dirty="0"/>
+          </a:p>
+        </p:txBody>
+      </p:sp>
+      <p:sp>
+        <p:nvSpPr>
+          <p:cNvPr id="5" name="矩形 4">
+            <a:extLst>
+              <a:ext uri="{FF2B5EF4-FFF2-40B4-BE49-F238E27FC236}">
+                <a16:creationId xmlns:a16="http://schemas.microsoft.com/office/drawing/2014/main" id="{11B2107D-2431-C44C-939A-06122207BE62}"/>
+              </a:ext>
+            </a:extLst>
+          </p:cNvPr>
+          <p:cNvSpPr/>
+          <p:nvPr/>
+        </p:nvSpPr>
+        <p:spPr>
+          <a:xfrm>
+            <a:off x="457200" y="699075"/>
+            <a:ext cx="11518900" cy="5201424"/>
+          </a:xfrm>
+          <a:prstGeom prst="rect">
+            <a:avLst/>
+          </a:prstGeom>
+          <a:noFill/>
+        </p:spPr>
+        <p:txBody>
+          <a:bodyPr wrap="square" rtlCol="0">
+            <a:spAutoFit/>
+          </a:bodyPr>
+          <a:lstStyle/>
+          <a:p>
+            <a:pPr marL="457200" indent="-457200">
+              <a:buFont typeface="Wingdings" pitchFamily="2" charset="2"/>
+              <a:buChar char="l"/>
+            </a:pPr>
+            <a:r>
+              <a:rPr kumimoji="1" lang="en" altLang="zh-CN" sz="2800" b="1" dirty="0" err="1"/>
+              <a:t>Xingchen</a:t>
+            </a:r>
+            <a:r>
+              <a:rPr kumimoji="1" lang="en" altLang="zh-CN" sz="2800" b="1" dirty="0"/>
+              <a:t> Ming</a:t>
+            </a:r>
+          </a:p>
+          <a:p>
+            <a:pPr marL="914400" lvl="1" indent="-457200">
+              <a:buFont typeface="Wingdings" pitchFamily="2" charset="2"/>
+              <a:buChar char="Ø"/>
+            </a:pPr>
+            <a:r>
+              <a:rPr kumimoji="1" lang="en-US" altLang="zh-CN" sz="2400" dirty="0"/>
+              <a:t>Sourcing</a:t>
+            </a:r>
+            <a:r>
+              <a:rPr kumimoji="1" lang="zh-CN" altLang="en-US" sz="2400" dirty="0"/>
+              <a:t> </a:t>
+            </a:r>
+            <a:r>
+              <a:rPr kumimoji="1" lang="en-US" altLang="zh-CN" sz="2400" dirty="0"/>
+              <a:t>for</a:t>
+            </a:r>
+            <a:r>
+              <a:rPr kumimoji="1" lang="zh-CN" altLang="en-US" sz="2400" dirty="0"/>
+              <a:t> </a:t>
+            </a:r>
+            <a:r>
+              <a:rPr kumimoji="1" lang="en-US" altLang="zh-CN" sz="2400" dirty="0"/>
+              <a:t>other</a:t>
+            </a:r>
+            <a:r>
+              <a:rPr kumimoji="1" lang="zh-CN" altLang="en-US" sz="2400" dirty="0"/>
+              <a:t> </a:t>
+            </a:r>
+            <a:r>
+              <a:rPr kumimoji="1" lang="en-US" altLang="zh-CN" sz="2400" dirty="0"/>
+              <a:t>image</a:t>
+            </a:r>
+            <a:r>
+              <a:rPr kumimoji="1" lang="zh-CN" altLang="en-US" sz="2400" dirty="0"/>
+              <a:t> </a:t>
+            </a:r>
+            <a:r>
+              <a:rPr kumimoji="1" lang="en-US" altLang="zh-CN" sz="2400" dirty="0"/>
+              <a:t>dataset</a:t>
+            </a:r>
+            <a:r>
+              <a:rPr kumimoji="1" lang="zh-CN" altLang="en-US" sz="2400" dirty="0"/>
+              <a:t> </a:t>
+            </a:r>
+            <a:r>
+              <a:rPr kumimoji="1" lang="en-US" altLang="zh-CN" sz="2400" dirty="0"/>
+              <a:t>for</a:t>
+            </a:r>
+            <a:r>
+              <a:rPr kumimoji="1" lang="zh-CN" altLang="en-US" sz="2400" dirty="0"/>
+              <a:t> </a:t>
+            </a:r>
+            <a:r>
+              <a:rPr kumimoji="1" lang="en-US" altLang="zh-CN" sz="2400" dirty="0"/>
+              <a:t>contour</a:t>
+            </a:r>
+            <a:r>
+              <a:rPr kumimoji="1" lang="zh-CN" altLang="en-US" sz="2400" dirty="0"/>
+              <a:t> </a:t>
+            </a:r>
+            <a:r>
+              <a:rPr kumimoji="1" lang="en-US" altLang="zh-CN" sz="2400" dirty="0"/>
+              <a:t>detection</a:t>
+            </a:r>
+          </a:p>
+          <a:p>
+            <a:pPr marL="914400" lvl="1" indent="-457200">
+              <a:buFont typeface="Wingdings" pitchFamily="2" charset="2"/>
+              <a:buChar char="Ø"/>
+            </a:pPr>
+            <a:r>
+              <a:rPr kumimoji="1" lang="en-US" altLang="zh-CN" sz="2400" dirty="0"/>
+              <a:t>Data</a:t>
+            </a:r>
+            <a:r>
+              <a:rPr kumimoji="1" lang="zh-CN" altLang="en-US" sz="2400" dirty="0"/>
+              <a:t> </a:t>
+            </a:r>
+            <a:r>
+              <a:rPr kumimoji="1" lang="en-US" altLang="zh-CN" sz="2400" dirty="0"/>
+              <a:t>augmentation</a:t>
+            </a:r>
+          </a:p>
+          <a:p>
+            <a:pPr marL="914400" lvl="1" indent="-457200">
+              <a:buFont typeface="Wingdings" pitchFamily="2" charset="2"/>
+              <a:buChar char="Ø"/>
+            </a:pPr>
+            <a:r>
+              <a:rPr kumimoji="1" lang="en-US" altLang="zh-CN" sz="2400" dirty="0"/>
+              <a:t>Explore different gradient descent algorithms</a:t>
+            </a:r>
+            <a:r>
+              <a:rPr kumimoji="1" lang="zh-CN" altLang="en-US" sz="2400" dirty="0"/>
+              <a:t> </a:t>
+            </a:r>
+            <a:endParaRPr kumimoji="1" lang="en-US" altLang="zh-CN" sz="2400" dirty="0"/>
+          </a:p>
+          <a:p>
+            <a:pPr marL="914400" lvl="1" indent="-457200">
+              <a:buFont typeface="Wingdings" pitchFamily="2" charset="2"/>
+              <a:buChar char="Ø"/>
+            </a:pPr>
+            <a:endParaRPr kumimoji="1" lang="en-US" altLang="zh-CN" sz="2400" dirty="0"/>
+          </a:p>
+          <a:p>
+            <a:pPr marL="457200" indent="-457200">
+              <a:buFont typeface="Wingdings" pitchFamily="2" charset="2"/>
+              <a:buChar char="l"/>
+            </a:pPr>
+            <a:r>
+              <a:rPr kumimoji="1" lang="en-US" altLang="zh-CN" sz="2800" b="1" dirty="0"/>
+              <a:t>Ming</a:t>
+            </a:r>
+            <a:r>
+              <a:rPr kumimoji="1" lang="zh-CN" altLang="en-US" sz="2800" b="1" dirty="0"/>
+              <a:t> </a:t>
+            </a:r>
+            <a:r>
+              <a:rPr kumimoji="1" lang="en-US" altLang="zh-CN" sz="2800" b="1" dirty="0"/>
+              <a:t>Xu</a:t>
+            </a:r>
+          </a:p>
+          <a:p>
+            <a:pPr marL="914400" lvl="1" indent="-457200">
+              <a:buFont typeface="Wingdings" pitchFamily="2" charset="2"/>
+              <a:buChar char="Ø"/>
+            </a:pPr>
+            <a:r>
+              <a:rPr kumimoji="1" lang="en" altLang="zh-CN" sz="2400" dirty="0"/>
+              <a:t>Optimize </a:t>
+            </a:r>
+            <a:r>
+              <a:rPr kumimoji="1" lang="en" altLang="zh-CN" sz="2400" dirty="0" err="1"/>
+              <a:t>boundar</a:t>
+            </a:r>
+            <a:r>
+              <a:rPr kumimoji="1" lang="en-US" altLang="zh-CN" sz="2400" dirty="0"/>
+              <a:t>y</a:t>
+            </a:r>
+            <a:r>
+              <a:rPr kumimoji="1" lang="zh-CN" altLang="en-US" sz="2400" dirty="0"/>
+              <a:t> </a:t>
+            </a:r>
+            <a:r>
+              <a:rPr kumimoji="1" lang="en-US" altLang="zh-CN" sz="2400" dirty="0"/>
+              <a:t>detection</a:t>
+            </a:r>
+          </a:p>
+          <a:p>
+            <a:pPr marL="914400" lvl="1" indent="-457200">
+              <a:buFont typeface="Wingdings" pitchFamily="2" charset="2"/>
+              <a:buChar char="Ø"/>
+            </a:pPr>
+            <a:r>
+              <a:rPr kumimoji="1" lang="en-US" altLang="zh-CN" sz="2400"/>
+              <a:t>…</a:t>
+            </a:r>
+            <a:endParaRPr kumimoji="1" lang="en" altLang="zh-CN" sz="2400" dirty="0"/>
+          </a:p>
+          <a:p>
+            <a:pPr marL="914400" lvl="1" indent="-457200">
+              <a:buFont typeface="Wingdings" pitchFamily="2" charset="2"/>
+              <a:buChar char="Ø"/>
+            </a:pPr>
+            <a:endParaRPr kumimoji="1" lang="en-US" altLang="zh-CN" sz="2800" b="1" dirty="0"/>
+          </a:p>
+          <a:p>
+            <a:pPr marL="457200" indent="-457200">
+              <a:buFont typeface="Wingdings" pitchFamily="2" charset="2"/>
+              <a:buChar char="l"/>
+            </a:pPr>
+            <a:r>
+              <a:rPr kumimoji="1" lang="en-US" altLang="zh-CN" sz="2800" b="1" dirty="0" err="1"/>
+              <a:t>Geng</a:t>
+            </a:r>
+            <a:r>
+              <a:rPr kumimoji="1" lang="zh-CN" altLang="en-US" sz="2800" b="1" dirty="0"/>
+              <a:t> </a:t>
+            </a:r>
+            <a:r>
+              <a:rPr kumimoji="1" lang="en-US" altLang="zh-CN" sz="2800" b="1" dirty="0"/>
+              <a:t>Yang</a:t>
+            </a:r>
+          </a:p>
+          <a:p>
+            <a:pPr marL="914400" lvl="1" indent="-457200">
+              <a:buFont typeface="Wingdings" pitchFamily="2" charset="2"/>
+              <a:buChar char="Ø"/>
+            </a:pPr>
+            <a:r>
+              <a:rPr kumimoji="1" lang="en-US" altLang="zh-CN" sz="2400" dirty="0"/>
+              <a:t>Explore different architecture of Generator</a:t>
+            </a:r>
+          </a:p>
+          <a:p>
+            <a:pPr marL="914400" lvl="1" indent="-457200">
+              <a:buFont typeface="Wingdings" pitchFamily="2" charset="2"/>
+              <a:buChar char="Ø"/>
+            </a:pPr>
+            <a:r>
+              <a:rPr kumimoji="1" lang="en-US" altLang="zh-CN" sz="2400" dirty="0"/>
+              <a:t>Explore</a:t>
+            </a:r>
+            <a:r>
+              <a:rPr kumimoji="1" lang="en-US" altLang="zh-CN" sz="2400" dirty="0">
+                <a:sym typeface="Wingdings" pitchFamily="2" charset="2"/>
+              </a:rPr>
+              <a:t> different architecture of Discriminator</a:t>
+            </a:r>
+            <a:endParaRPr kumimoji="1" lang="en-US" altLang="zh-CN" sz="2400" dirty="0"/>
+          </a:p>
+          <a:p>
+            <a:pPr marL="457200" indent="-457200">
+              <a:buFont typeface="Wingdings" pitchFamily="2" charset="2"/>
+              <a:buChar char="l"/>
+            </a:pPr>
+            <a:endParaRPr kumimoji="1" lang="en-US" altLang="zh-CN" sz="2800" b="1" dirty="0"/>
           </a:p>
         </p:txBody>
       </p:sp>

</xml_diff>